<commit_message>
Modified deck templates to allow filling in speaker name
</commit_message>
<xml_diff>
--- a/Decks/SessionTemplate/NETConfTemplate.pptx
+++ b/Decks/SessionTemplate/NETConfTemplate.pptx
@@ -151,6 +151,10 @@
 </p:cmAuthorLst>
 </file>
 
+<file path=ppt/revisionInfo.xml><?xml version="1.0" encoding="utf-8"?>
+<p1510:revInfo xmlns:a="http://schemas.openxmlformats.org/drawingml/2006/main" xmlns:r="http://schemas.openxmlformats.org/officeDocument/2006/relationships" xmlns:p1510="http://schemas.microsoft.com/office/powerpoint/2015/10/main"/>
+</file>
+
 <file path=ppt/notesMasters/notesMaster1.xml><?xml version="1.0" encoding="utf-8"?>
 <p:notesMaster xmlns:a="http://schemas.openxmlformats.org/drawingml/2006/main" xmlns:r="http://schemas.openxmlformats.org/officeDocument/2006/relationships" xmlns:p="http://schemas.openxmlformats.org/presentationml/2006/main">
   <p:cSld>
@@ -233,7 +237,7 @@
           <a:p>
             <a:fld id="{9A7A0A5C-BDFE-4AA0-8363-842B4B5195FB}" type="datetimeFigureOut">
               <a:rPr lang="en-US" smtClean="0"/>
-              <a:t>8/17/2017</a:t>
+              <a:t>9/11/2017</a:t>
             </a:fld>
             <a:endParaRPr lang="en-US"/>
           </a:p>
@@ -965,100 +969,6 @@
       </p:pic>
       <p:sp>
         <p:nvSpPr>
-          <p:cNvPr id="6" name="TextBox 5">
-            <a:extLst>
-              <a:ext uri="{FF2B5EF4-FFF2-40B4-BE49-F238E27FC236}">
-                <a16:creationId xmlns:a16="http://schemas.microsoft.com/office/drawing/2014/main" id="{3C13B10B-C71C-4EF5-A560-A735E108C70D}"/>
-              </a:ext>
-            </a:extLst>
-          </p:cNvPr>
-          <p:cNvSpPr txBox="1"/>
-          <p:nvPr userDrawn="1"/>
-        </p:nvSpPr>
-        <p:spPr>
-          <a:xfrm>
-            <a:off x="380011" y="2087126"/>
-            <a:ext cx="10390909" cy="904863"/>
-          </a:xfrm>
-          <a:prstGeom prst="rect">
-            <a:avLst/>
-          </a:prstGeom>
-          <a:noFill/>
-        </p:spPr>
-        <p:txBody>
-          <a:bodyPr wrap="square" lIns="182880" tIns="146304" rIns="182880" bIns="146304" rtlCol="0">
-            <a:spAutoFit/>
-          </a:bodyPr>
-          <a:lstStyle/>
-          <a:p>
-            <a:pPr>
-              <a:lnSpc>
-                <a:spcPct val="90000"/>
-              </a:lnSpc>
-              <a:spcAft>
-                <a:spcPts val="600"/>
-              </a:spcAft>
-            </a:pPr>
-            <a:r>
-              <a:rPr lang="en-US" sz="4400" dirty="0">
-                <a:solidFill>
-                  <a:schemeClr val="bg1"/>
-                </a:solidFill>
-              </a:rPr>
-              <a:t>Session Title</a:t>
-            </a:r>
-          </a:p>
-        </p:txBody>
-      </p:sp>
-      <p:sp>
-        <p:nvSpPr>
-          <p:cNvPr id="7" name="TextBox 6">
-            <a:extLst>
-              <a:ext uri="{FF2B5EF4-FFF2-40B4-BE49-F238E27FC236}">
-                <a16:creationId xmlns:a16="http://schemas.microsoft.com/office/drawing/2014/main" id="{6944DF33-867A-4A36-83BA-1B9AEE45800C}"/>
-              </a:ext>
-            </a:extLst>
-          </p:cNvPr>
-          <p:cNvSpPr txBox="1"/>
-          <p:nvPr userDrawn="1"/>
-        </p:nvSpPr>
-        <p:spPr>
-          <a:xfrm>
-            <a:off x="380011" y="4132614"/>
-            <a:ext cx="4969823" cy="627864"/>
-          </a:xfrm>
-          <a:prstGeom prst="rect">
-            <a:avLst/>
-          </a:prstGeom>
-          <a:noFill/>
-        </p:spPr>
-        <p:txBody>
-          <a:bodyPr wrap="square" lIns="182880" tIns="146304" rIns="182880" bIns="146304" rtlCol="0">
-            <a:spAutoFit/>
-          </a:bodyPr>
-          <a:lstStyle/>
-          <a:p>
-            <a:pPr>
-              <a:lnSpc>
-                <a:spcPct val="90000"/>
-              </a:lnSpc>
-              <a:spcAft>
-                <a:spcPts val="600"/>
-              </a:spcAft>
-            </a:pPr>
-            <a:r>
-              <a:rPr lang="en-US" sz="2400" dirty="0">
-                <a:solidFill>
-                  <a:schemeClr val="bg1"/>
-                </a:solidFill>
-              </a:rPr>
-              <a:t>Speaker Name</a:t>
-            </a:r>
-          </a:p>
-        </p:txBody>
-      </p:sp>
-      <p:sp>
-        <p:nvSpPr>
           <p:cNvPr id="8" name="TextBox 7">
             <a:extLst>
               <a:ext uri="{FF2B5EF4-FFF2-40B4-BE49-F238E27FC236}">
@@ -1135,6 +1045,92 @@
                 <a:lin ang="5400000" scaled="0"/>
               </a:gradFill>
             </a:endParaRPr>
+          </a:p>
+        </p:txBody>
+      </p:sp>
+      <p:sp>
+        <p:nvSpPr>
+          <p:cNvPr id="2" name="Title 1">
+            <a:extLst>
+              <a:ext uri="{FF2B5EF4-FFF2-40B4-BE49-F238E27FC236}">
+                <a16:creationId xmlns:a16="http://schemas.microsoft.com/office/drawing/2014/main" id="{E83FFA8C-0B63-40B6-A827-BFFE5D75FDD0}"/>
+              </a:ext>
+            </a:extLst>
+          </p:cNvPr>
+          <p:cNvSpPr>
+            <a:spLocks noGrp="1"/>
+          </p:cNvSpPr>
+          <p:nvPr>
+            <p:ph type="title" hasCustomPrompt="1"/>
+          </p:nvPr>
+        </p:nvSpPr>
+        <p:spPr>
+          <a:xfrm>
+            <a:off x="438206" y="2608084"/>
+            <a:ext cx="11655840" cy="899665"/>
+          </a:xfrm>
+        </p:spPr>
+        <p:txBody>
+          <a:bodyPr/>
+          <a:lstStyle>
+            <a:lvl1pPr>
+              <a:defRPr sz="4400">
+                <a:solidFill>
+                  <a:schemeClr val="bg1"/>
+                </a:solidFill>
+                <a:latin typeface="+mn-lt"/>
+              </a:defRPr>
+            </a:lvl1pPr>
+          </a:lstStyle>
+          <a:p>
+            <a:r>
+              <a:rPr lang="en-US" dirty="0"/>
+              <a:t>Session Title</a:t>
+            </a:r>
+          </a:p>
+        </p:txBody>
+      </p:sp>
+      <p:sp>
+        <p:nvSpPr>
+          <p:cNvPr id="9" name="Text Placeholder 8">
+            <a:extLst>
+              <a:ext uri="{FF2B5EF4-FFF2-40B4-BE49-F238E27FC236}">
+                <a16:creationId xmlns:a16="http://schemas.microsoft.com/office/drawing/2014/main" id="{AF327309-25BC-4FEC-AA25-95EAC4318806}"/>
+              </a:ext>
+            </a:extLst>
+          </p:cNvPr>
+          <p:cNvSpPr>
+            <a:spLocks noGrp="1"/>
+          </p:cNvSpPr>
+          <p:nvPr>
+            <p:ph type="body" sz="quarter" idx="10" hasCustomPrompt="1"/>
+          </p:nvPr>
+        </p:nvSpPr>
+        <p:spPr>
+          <a:xfrm>
+            <a:off x="438150" y="4140200"/>
+            <a:ext cx="5708650" cy="627864"/>
+          </a:xfrm>
+        </p:spPr>
+        <p:txBody>
+          <a:bodyPr/>
+          <a:lstStyle>
+            <a:lvl1pPr marL="0" indent="0">
+              <a:buNone/>
+              <a:defRPr sz="3200">
+                <a:solidFill>
+                  <a:schemeClr val="bg1"/>
+                </a:solidFill>
+                <a:latin typeface="+mj-lt"/>
+              </a:defRPr>
+            </a:lvl1pPr>
+          </a:lstStyle>
+          <a:p>
+            <a:pPr lvl="0"/>
+            <a:r>
+              <a:rPr lang="en-US" dirty="0"/>
+              <a:t>Speaker Name</a:t>
+            </a:r>
           </a:p>
         </p:txBody>
       </p:sp>
@@ -5564,34 +5560,12 @@
 </file>
 
 <file path=customXml/item1.xml><?xml version="1.0" encoding="utf-8"?>
-<p:properties xmlns:p="http://schemas.microsoft.com/office/2006/metadata/properties" xmlns:xsi="http://www.w3.org/2001/XMLSchema-instance" xmlns:pc="http://schemas.microsoft.com/office/infopath/2007/PartnerControls">
-  <documentManagement>
-    <LastSharedByUser xmlns="b0e4521d-181b-4aee-b4a8-952b2bc14729">scothu@microsoft.com</LastSharedByUser>
-    <SharedWithUsers xmlns="b0e4521d-181b-4aee-b4a8-952b2bc14729">
-      <UserInfo>
-        <DisplayName>Diego Vega</DisplayName>
-        <AccountId>30</AccountId>
-        <AccountType/>
-      </UserInfo>
-      <UserInfo>
-        <DisplayName>Daniel Roth</DisplayName>
-        <AccountId>31</AccountId>
-        <AccountType/>
-      </UserInfo>
-      <UserInfo>
-        <DisplayName>Kasey Uhlenhuth</DisplayName>
-        <AccountId>32</AccountId>
-        <AccountType/>
-      </UserInfo>
-      <UserInfo>
-        <DisplayName>Andrew Hall (DEVDIV)</DisplayName>
-        <AccountId>33</AccountId>
-        <AccountType/>
-      </UserInfo>
-    </SharedWithUsers>
-    <LastSharedByTime xmlns="b0e4521d-181b-4aee-b4a8-952b2bc14729">2017-08-02T01:28:32+00:00</LastSharedByTime>
-  </documentManagement>
-</p:properties>
+<?mso-contentType ?>
+<FormTemplates xmlns="http://schemas.microsoft.com/sharepoint/v3/contenttype/forms">
+  <Display>DocumentLibraryForm</Display>
+  <Edit>DocumentLibraryForm</Edit>
+  <New>DocumentLibraryForm</New>
+</FormTemplates>
 </file>
 
 <file path=customXml/item2.xml><?xml version="1.0" encoding="utf-8"?>
@@ -5772,27 +5746,40 @@
 </file>
 
 <file path=customXml/item3.xml><?xml version="1.0" encoding="utf-8"?>
-<?mso-contentType ?>
-<FormTemplates xmlns="http://schemas.microsoft.com/sharepoint/v3/contenttype/forms">
-  <Display>DocumentLibraryForm</Display>
-  <Edit>DocumentLibraryForm</Edit>
-  <New>DocumentLibraryForm</New>
-</FormTemplates>
+<p:properties xmlns:p="http://schemas.microsoft.com/office/2006/metadata/properties" xmlns:xsi="http://www.w3.org/2001/XMLSchema-instance" xmlns:pc="http://schemas.microsoft.com/office/infopath/2007/PartnerControls">
+  <documentManagement>
+    <LastSharedByUser xmlns="b0e4521d-181b-4aee-b4a8-952b2bc14729">scothu@microsoft.com</LastSharedByUser>
+    <SharedWithUsers xmlns="b0e4521d-181b-4aee-b4a8-952b2bc14729">
+      <UserInfo>
+        <DisplayName>Diego Vega</DisplayName>
+        <AccountId>30</AccountId>
+        <AccountType/>
+      </UserInfo>
+      <UserInfo>
+        <DisplayName>Daniel Roth</DisplayName>
+        <AccountId>31</AccountId>
+        <AccountType/>
+      </UserInfo>
+      <UserInfo>
+        <DisplayName>Kasey Uhlenhuth</DisplayName>
+        <AccountId>32</AccountId>
+        <AccountType/>
+      </UserInfo>
+      <UserInfo>
+        <DisplayName>Andrew Hall (DEVDIV)</DisplayName>
+        <AccountId>33</AccountId>
+        <AccountType/>
+      </UserInfo>
+    </SharedWithUsers>
+    <LastSharedByTime xmlns="b0e4521d-181b-4aee-b4a8-952b2bc14729">2017-08-02T01:28:32+00:00</LastSharedByTime>
+  </documentManagement>
+</p:properties>
 </file>
 
 <file path=customXml/itemProps1.xml><?xml version="1.0" encoding="utf-8"?>
-<ds:datastoreItem xmlns:ds="http://schemas.openxmlformats.org/officeDocument/2006/customXml" ds:itemID="{632051C8-1D54-4CAE-822B-9BF5C05E3E63}">
+<ds:datastoreItem xmlns:ds="http://schemas.openxmlformats.org/officeDocument/2006/customXml" ds:itemID="{5479B346-B91C-44CF-9CBE-5329E476BFD7}">
   <ds:schemaRefs>
-    <ds:schemaRef ds:uri="http://purl.org/dc/terms/"/>
-    <ds:schemaRef ds:uri="b0e4521d-181b-4aee-b4a8-952b2bc14729"/>
-    <ds:schemaRef ds:uri="http://schemas.microsoft.com/office/2006/documentManagement/types"/>
-    <ds:schemaRef ds:uri="ed971524-76e7-40a8-a01a-f99956bd178c"/>
-    <ds:schemaRef ds:uri="http://purl.org/dc/elements/1.1/"/>
-    <ds:schemaRef ds:uri="http://schemas.microsoft.com/office/2006/metadata/properties"/>
-    <ds:schemaRef ds:uri="http://schemas.microsoft.com/office/infopath/2007/PartnerControls"/>
-    <ds:schemaRef ds:uri="http://schemas.openxmlformats.org/package/2006/metadata/core-properties"/>
-    <ds:schemaRef ds:uri="http://www.w3.org/XML/1998/namespace"/>
-    <ds:schemaRef ds:uri="http://purl.org/dc/dcmitype/"/>
+    <ds:schemaRef ds:uri="http://schemas.microsoft.com/sharepoint/v3/contenttype/forms"/>
   </ds:schemaRefs>
 </ds:datastoreItem>
 </file>
@@ -5817,9 +5804,18 @@
 </file>
 
 <file path=customXml/itemProps3.xml><?xml version="1.0" encoding="utf-8"?>
-<ds:datastoreItem xmlns:ds="http://schemas.openxmlformats.org/officeDocument/2006/customXml" ds:itemID="{5479B346-B91C-44CF-9CBE-5329E476BFD7}">
+<ds:datastoreItem xmlns:ds="http://schemas.openxmlformats.org/officeDocument/2006/customXml" ds:itemID="{632051C8-1D54-4CAE-822B-9BF5C05E3E63}">
   <ds:schemaRefs>
-    <ds:schemaRef ds:uri="http://schemas.microsoft.com/sharepoint/v3/contenttype/forms"/>
+    <ds:schemaRef ds:uri="http://purl.org/dc/terms/"/>
+    <ds:schemaRef ds:uri="b0e4521d-181b-4aee-b4a8-952b2bc14729"/>
+    <ds:schemaRef ds:uri="http://schemas.microsoft.com/office/2006/documentManagement/types"/>
+    <ds:schemaRef ds:uri="ed971524-76e7-40a8-a01a-f99956bd178c"/>
+    <ds:schemaRef ds:uri="http://purl.org/dc/elements/1.1/"/>
+    <ds:schemaRef ds:uri="http://schemas.microsoft.com/office/2006/metadata/properties"/>
+    <ds:schemaRef ds:uri="http://schemas.microsoft.com/office/infopath/2007/PartnerControls"/>
+    <ds:schemaRef ds:uri="http://schemas.openxmlformats.org/package/2006/metadata/core-properties"/>
+    <ds:schemaRef ds:uri="http://www.w3.org/XML/1998/namespace"/>
+    <ds:schemaRef ds:uri="http://purl.org/dc/dcmitype/"/>
   </ds:schemaRefs>
 </ds:datastoreItem>
 </file>
</xml_diff>